<commit_message>
changes to Week 1 stuff
</commit_message>
<xml_diff>
--- a/Week 1 -- Likelihoods and linear models/Lab 1/Lab 1 -- Generalized linear models.pptx
+++ b/Week 1 -- Likelihoods and linear models/Lab 1/Lab 1 -- Generalized linear models.pptx
@@ -232,7 +232,7 @@
           <a:p>
             <a:fld id="{8269ACBE-EB3C-4D08-AD61-FACAD5A421FA}" type="datetimeFigureOut">
               <a:rPr lang="en-US" smtClean="0"/>
-              <a:t>3/28/2016</a:t>
+              <a:t>3/31/2016</a:t>
             </a:fld>
             <a:endParaRPr lang="en-US"/>
           </a:p>
@@ -3780,7 +3780,11 @@
           <a:p>
             <a:r>
               <a:rPr lang="en-US" dirty="0" smtClean="0"/>
-              <a:t>March 31, 2015</a:t>
+              <a:t>March 31, </a:t>
+            </a:r>
+            <a:r>
+              <a:rPr lang="en-US" dirty="0" smtClean="0"/>
+              <a:t>2016</a:t>
             </a:r>
             <a:endParaRPr lang="en-US" dirty="0"/>
           </a:p>
@@ -5572,8 +5576,8 @@
           </a:p>
         </p:txBody>
       </p:sp>
-      <mc:AlternateContent xmlns:mc="http://schemas.openxmlformats.org/markup-compatibility/2006">
-        <mc:Choice xmlns:a14="http://schemas.microsoft.com/office/drawing/2010/main" Requires="a14">
+      <mc:AlternateContent xmlns:mc="http://schemas.openxmlformats.org/markup-compatibility/2006" xmlns:a14="http://schemas.microsoft.com/office/drawing/2010/main">
+        <mc:Choice Requires="a14">
           <p:sp>
             <p:nvSpPr>
               <p:cNvPr id="3" name="Content Placeholder 2"/>
@@ -6133,7 +6137,7 @@
             </p:txBody>
           </p:sp>
         </mc:Choice>
-        <mc:Fallback>
+        <mc:Fallback xmlns="">
           <p:sp>
             <p:nvSpPr>
               <p:cNvPr id="3" name="Content Placeholder 2"/>
@@ -7646,6 +7650,9 @@
           <a:bodyPr/>
           <a:lstStyle/>
           <a:p>
+            <a:pPr marL="0" indent="0">
+              <a:buNone/>
+            </a:pPr>
             <a:r>
               <a:rPr lang="en-US" dirty="0" smtClean="0"/>
               <a:t>Conclusion</a:t>
@@ -7655,8 +7662,9 @@
             <a:pPr lvl="1"/>
             <a:r>
               <a:rPr lang="en-US" dirty="0" smtClean="0"/>
-              <a:t>Still doesn’t give very good fit!</a:t>
+              <a:t>Decent fit…</a:t>
             </a:r>
+            <a:endParaRPr lang="en-US" dirty="0" smtClean="0"/>
           </a:p>
           <a:p>
             <a:pPr lvl="1"/>
@@ -7666,7 +7674,7 @@
       </p:sp>
       <p:pic>
         <p:nvPicPr>
-          <p:cNvPr id="4" name="Picture 3"/>
+          <p:cNvPr id="5" name="Picture 4"/>
           <p:cNvPicPr>
             <a:picLocks noChangeAspect="1"/>
           </p:cNvPicPr>
@@ -7686,8 +7694,8 @@
         </p:blipFill>
         <p:spPr>
           <a:xfrm>
-            <a:off x="2201875" y="1971446"/>
-            <a:ext cx="4886554" cy="4886554"/>
+            <a:off x="2315976" y="1840038"/>
+            <a:ext cx="4864313" cy="4864313"/>
           </a:xfrm>
           <a:prstGeom prst="rect">
             <a:avLst/>
@@ -7750,8 +7758,8 @@
           </a:p>
         </p:txBody>
       </p:sp>
-      <mc:AlternateContent xmlns:mc="http://schemas.openxmlformats.org/markup-compatibility/2006" xmlns:a14="http://schemas.microsoft.com/office/drawing/2010/main">
-        <mc:Choice Requires="a14">
+      <mc:AlternateContent xmlns:mc="http://schemas.openxmlformats.org/markup-compatibility/2006">
+        <mc:Choice xmlns:a14="http://schemas.microsoft.com/office/drawing/2010/main" Requires="a14">
           <p:sp>
             <p:nvSpPr>
               <p:cNvPr id="3" name="Content Placeholder 2"/>
@@ -7765,7 +7773,7 @@
             <p:spPr/>
             <p:txBody>
               <a:bodyPr>
-                <a:normAutofit/>
+                <a:normAutofit fontScale="70000" lnSpcReduction="20000"/>
               </a:bodyPr>
               <a:lstStyle/>
               <a:p>
@@ -7773,7 +7781,7 @@
                   <a:buNone/>
                 </a:pPr>
                 <a:r>
-                  <a:rPr lang="en-US" dirty="0" smtClean="0"/>
+                  <a:rPr lang="en-US" sz="4000" dirty="0" smtClean="0"/>
                   <a:t>How do we assess fit?</a:t>
                 </a:r>
               </a:p>
@@ -7800,93 +7808,6 @@
                 </a:pPr>
                 <a14:m>
                   <m:oMath xmlns:m="http://schemas.openxmlformats.org/officeDocument/2006/math">
-                    <m:r>
-                      <m:rPr>
-                        <m:sty m:val="p"/>
-                      </m:rPr>
-                      <a:rPr lang="en-US">
-                        <a:latin typeface="Cambria Math" panose="02040503050406030204" pitchFamily="18" charset="0"/>
-                      </a:rPr>
-                      <m:t>Pr</m:t>
-                    </m:r>
-                    <m:r>
-                      <a:rPr lang="en-US" i="1">
-                        <a:latin typeface="Cambria Math" panose="02040503050406030204" pitchFamily="18" charset="0"/>
-                      </a:rPr>
-                      <m:t>⁡(</m:t>
-                    </m:r>
-                    <m:sSub>
-                      <m:sSubPr>
-                        <m:ctrlPr>
-                          <a:rPr lang="en-US" i="1">
-                            <a:latin typeface="Cambria Math" panose="02040503050406030204" pitchFamily="18" charset="0"/>
-                          </a:rPr>
-                        </m:ctrlPr>
-                      </m:sSubPr>
-                      <m:e>
-                        <m:r>
-                          <a:rPr lang="en-US" i="1">
-                            <a:latin typeface="Cambria Math" panose="02040503050406030204" pitchFamily="18" charset="0"/>
-                          </a:rPr>
-                          <m:t>𝑦</m:t>
-                        </m:r>
-                      </m:e>
-                      <m:sub>
-                        <m:r>
-                          <a:rPr lang="en-US" i="1">
-                            <a:latin typeface="Cambria Math" panose="02040503050406030204" pitchFamily="18" charset="0"/>
-                          </a:rPr>
-                          <m:t>𝑖</m:t>
-                        </m:r>
-                      </m:sub>
-                    </m:sSub>
-                    <m:r>
-                      <a:rPr lang="en-US" i="1">
-                        <a:latin typeface="Cambria Math" panose="02040503050406030204" pitchFamily="18" charset="0"/>
-                      </a:rPr>
-                      <m:t>|</m:t>
-                    </m:r>
-                    <m:sSub>
-                      <m:sSubPr>
-                        <m:ctrlPr>
-                          <a:rPr lang="en-US" b="1" i="1">
-                            <a:latin typeface="Cambria Math" panose="02040503050406030204" pitchFamily="18" charset="0"/>
-                            <a:ea typeface="Cambria Math" panose="02040503050406030204" pitchFamily="18" charset="0"/>
-                          </a:rPr>
-                        </m:ctrlPr>
-                      </m:sSubPr>
-                      <m:e>
-                        <m:r>
-                          <a:rPr lang="en-US" b="1">
-                            <a:latin typeface="Cambria Math" panose="02040503050406030204" pitchFamily="18" charset="0"/>
-                            <a:ea typeface="Cambria Math" panose="02040503050406030204" pitchFamily="18" charset="0"/>
-                          </a:rPr>
-                          <m:t>𝛉</m:t>
-                        </m:r>
-                      </m:e>
-                      <m:sub>
-                        <m:r>
-                          <a:rPr lang="en-US">
-                            <a:latin typeface="Cambria Math" panose="02040503050406030204" pitchFamily="18" charset="0"/>
-                            <a:ea typeface="Cambria Math" panose="02040503050406030204" pitchFamily="18" charset="0"/>
-                          </a:rPr>
-                          <m:t>0</m:t>
-                        </m:r>
-                      </m:sub>
-                    </m:sSub>
-                    <m:r>
-                      <a:rPr lang="en-US" i="1">
-                        <a:latin typeface="Cambria Math" panose="02040503050406030204" pitchFamily="18" charset="0"/>
-                        <a:ea typeface="Cambria Math" panose="02040503050406030204" pitchFamily="18" charset="0"/>
-                      </a:rPr>
-                      <m:t>)</m:t>
-                    </m:r>
-                    <m:r>
-                      <a:rPr lang="en-US" i="1">
-                        <a:latin typeface="Cambria Math" panose="02040503050406030204" pitchFamily="18" charset="0"/>
-                      </a:rPr>
-                      <m:t>~</m:t>
-                    </m:r>
                     <m:r>
                       <a:rPr lang="en-US" i="1">
                         <a:latin typeface="Cambria Math" panose="02040503050406030204" pitchFamily="18" charset="0"/>
@@ -7921,40 +7842,6 @@
                             <a:latin typeface="Cambria Math" panose="02040503050406030204" pitchFamily="18" charset="0"/>
                           </a:rPr>
                           <m:t>𝑖</m:t>
-                        </m:r>
-                      </m:sub>
-                    </m:sSub>
-                    <m:r>
-                      <a:rPr lang="en-US" b="1">
-                        <a:latin typeface="Cambria Math" panose="02040503050406030204" pitchFamily="18" charset="0"/>
-                      </a:rPr>
-                      <m:t>|</m:t>
-                    </m:r>
-                    <m:sSub>
-                      <m:sSubPr>
-                        <m:ctrlPr>
-                          <a:rPr lang="en-US" b="1" i="1">
-                            <a:latin typeface="Cambria Math" panose="02040503050406030204" pitchFamily="18" charset="0"/>
-                            <a:ea typeface="Cambria Math" panose="02040503050406030204" pitchFamily="18" charset="0"/>
-                          </a:rPr>
-                        </m:ctrlPr>
-                      </m:sSubPr>
-                      <m:e>
-                        <m:r>
-                          <a:rPr lang="en-US" b="1">
-                            <a:latin typeface="Cambria Math" panose="02040503050406030204" pitchFamily="18" charset="0"/>
-                            <a:ea typeface="Cambria Math" panose="02040503050406030204" pitchFamily="18" charset="0"/>
-                          </a:rPr>
-                          <m:t>𝛉</m:t>
-                        </m:r>
-                      </m:e>
-                      <m:sub>
-                        <m:r>
-                          <a:rPr lang="en-US">
-                            <a:latin typeface="Cambria Math" panose="02040503050406030204" pitchFamily="18" charset="0"/>
-                            <a:ea typeface="Cambria Math" panose="02040503050406030204" pitchFamily="18" charset="0"/>
-                          </a:rPr>
-                          <m:t>0</m:t>
                         </m:r>
                       </m:sub>
                     </m:sSub>
@@ -8069,13 +7956,14 @@
                   <a:rPr lang="en-US" dirty="0">
                     <a:ea typeface="Cambria Math" panose="02040503050406030204" pitchFamily="18" charset="0"/>
                   </a:rPr>
-                  <a:t> is your specified probability distribution</a:t>
+                  <a:t> is your specified probability </a:t>
                 </a:r>
-              </a:p>
-              <a:p>
-                <a:pPr marL="457200" lvl="1" indent="0" algn="ctr">
-                  <a:buNone/>
-                </a:pPr>
+                <a:r>
+                  <a:rPr lang="en-US" dirty="0" smtClean="0">
+                    <a:ea typeface="Cambria Math" panose="02040503050406030204" pitchFamily="18" charset="0"/>
+                  </a:rPr>
+                  <a:t>distribution</a:t>
+                </a:r>
                 <a:endParaRPr lang="en-US" dirty="0"/>
               </a:p>
               <a:p>
@@ -8110,86 +7998,11 @@
                         <a:rPr lang="en-US" b="0" i="0" smtClean="0">
                           <a:latin typeface="Cambria Math" panose="02040503050406030204" pitchFamily="18" charset="0"/>
                         </a:rPr>
-                        <m:t>score</m:t>
+                        <m:t>probability</m:t>
                       </m:r>
                       <m:r>
                         <a:rPr lang="en-US" b="0" i="1" smtClean="0">
                           <a:latin typeface="Cambria Math" panose="02040503050406030204" pitchFamily="18" charset="0"/>
-                          <a:ea typeface="Cambria Math" panose="02040503050406030204" pitchFamily="18" charset="0"/>
-                        </a:rPr>
-                        <m:t>∝  </m:t>
-                      </m:r>
-                      <m:r>
-                        <a:rPr lang="en-US" b="0" i="1" smtClean="0">
-                          <a:latin typeface="Cambria Math" panose="02040503050406030204" pitchFamily="18" charset="0"/>
-                          <a:ea typeface="Cambria Math" panose="02040503050406030204" pitchFamily="18" charset="0"/>
-                        </a:rPr>
-                        <m:t>𝐸</m:t>
-                      </m:r>
-                      <m:d>
-                        <m:dPr>
-                          <m:ctrlPr>
-                            <a:rPr lang="en-US" b="0" i="1" smtClean="0">
-                              <a:latin typeface="Cambria Math" panose="02040503050406030204" pitchFamily="18" charset="0"/>
-                              <a:ea typeface="Cambria Math" panose="02040503050406030204" pitchFamily="18" charset="0"/>
-                            </a:rPr>
-                          </m:ctrlPr>
-                        </m:dPr>
-                        <m:e>
-                          <m:r>
-                            <a:rPr lang="en-US" b="0" i="1" smtClean="0">
-                              <a:latin typeface="Cambria Math" panose="02040503050406030204" pitchFamily="18" charset="0"/>
-                              <a:ea typeface="Cambria Math" panose="02040503050406030204" pitchFamily="18" charset="0"/>
-                            </a:rPr>
-                            <m:t>𝑝</m:t>
-                          </m:r>
-                          <m:d>
-                            <m:dPr>
-                              <m:ctrlPr>
-                                <a:rPr lang="en-US" b="0" i="1" smtClean="0">
-                                  <a:latin typeface="Cambria Math" panose="02040503050406030204" pitchFamily="18" charset="0"/>
-                                  <a:ea typeface="Cambria Math" panose="02040503050406030204" pitchFamily="18" charset="0"/>
-                                </a:rPr>
-                              </m:ctrlPr>
-                            </m:dPr>
-                            <m:e>
-                              <m:r>
-                                <a:rPr lang="en-US" b="0" i="1" smtClean="0">
-                                  <a:latin typeface="Cambria Math" panose="02040503050406030204" pitchFamily="18" charset="0"/>
-                                  <a:ea typeface="Cambria Math" panose="02040503050406030204" pitchFamily="18" charset="0"/>
-                                </a:rPr>
-                                <m:t>𝑌</m:t>
-                              </m:r>
-                            </m:e>
-                            <m:e>
-                              <m:acc>
-                                <m:accPr>
-                                  <m:chr m:val="̂"/>
-                                  <m:ctrlPr>
-                                    <a:rPr lang="en-US" b="0" i="1" smtClean="0">
-                                      <a:latin typeface="Cambria Math" panose="02040503050406030204" pitchFamily="18" charset="0"/>
-                                      <a:ea typeface="Cambria Math" panose="02040503050406030204" pitchFamily="18" charset="0"/>
-                                    </a:rPr>
-                                  </m:ctrlPr>
-                                </m:accPr>
-                                <m:e>
-                                  <m:r>
-                                    <a:rPr lang="en-US" b="1">
-                                      <a:latin typeface="Cambria Math" panose="02040503050406030204" pitchFamily="18" charset="0"/>
-                                      <a:ea typeface="Cambria Math" panose="02040503050406030204" pitchFamily="18" charset="0"/>
-                                    </a:rPr>
-                                    <m:t>𝛉</m:t>
-                                  </m:r>
-                                </m:e>
-                              </m:acc>
-                            </m:e>
-                          </m:d>
-                        </m:e>
-                      </m:d>
-                      <m:r>
-                        <a:rPr lang="en-US" b="0" i="1" smtClean="0">
-                          <a:latin typeface="Cambria Math" panose="02040503050406030204" pitchFamily="18" charset="0"/>
-                          <a:ea typeface="Cambria Math" panose="02040503050406030204" pitchFamily="18" charset="0"/>
                         </a:rPr>
                         <m:t>=</m:t>
                       </m:r>
@@ -8219,10 +8032,11 @@
                             </m:funcPr>
                             <m:fName>
                               <m:r>
-                                <a:rPr lang="en-US" i="1">
+                                <a:rPr lang="en-US" b="0" i="1" smtClean="0">
                                   <a:latin typeface="Cambria Math" panose="02040503050406030204" pitchFamily="18" charset="0"/>
+                                  <a:ea typeface="Cambria Math" panose="02040503050406030204" pitchFamily="18" charset="0"/>
                                 </a:rPr>
-                                <m:t>𝑓</m:t>
+                                <m:t>𝑝</m:t>
                               </m:r>
                               <m:d>
                                 <m:dPr>
@@ -8233,78 +8047,41 @@
                                   </m:ctrlPr>
                                 </m:dPr>
                                 <m:e>
-                                  <m:r>
-                                    <a:rPr lang="en-US" i="1">
-                                      <a:latin typeface="Cambria Math" panose="02040503050406030204" pitchFamily="18" charset="0"/>
-                                      <a:ea typeface="Cambria Math" panose="02040503050406030204" pitchFamily="18" charset="0"/>
-                                    </a:rPr>
-                                    <m:t>𝑦</m:t>
-                                  </m:r>
-                                </m:e>
-                                <m:e>
-                                  <m:sSub>
-                                    <m:sSubPr>
+                                  <m:sSup>
+                                    <m:sSupPr>
                                       <m:ctrlPr>
-                                        <a:rPr lang="en-US" b="1" i="1">
+                                        <a:rPr lang="en-US" i="1">
                                           <a:latin typeface="Cambria Math" panose="02040503050406030204" pitchFamily="18" charset="0"/>
                                           <a:ea typeface="Cambria Math" panose="02040503050406030204" pitchFamily="18" charset="0"/>
                                         </a:rPr>
                                       </m:ctrlPr>
-                                    </m:sSubPr>
+                                    </m:sSupPr>
                                     <m:e>
                                       <m:r>
-                                        <a:rPr lang="en-US" b="1">
+                                        <a:rPr lang="en-US" i="1">
                                           <a:latin typeface="Cambria Math" panose="02040503050406030204" pitchFamily="18" charset="0"/>
                                           <a:ea typeface="Cambria Math" panose="02040503050406030204" pitchFamily="18" charset="0"/>
                                         </a:rPr>
-                                        <m:t>𝛉</m:t>
+                                        <m:t>𝑦</m:t>
                                       </m:r>
                                     </m:e>
-                                    <m:sub>
+                                    <m:sup>
                                       <m:r>
-                                        <a:rPr lang="en-US">
+                                        <a:rPr lang="en-US" i="1">
                                           <a:latin typeface="Cambria Math" panose="02040503050406030204" pitchFamily="18" charset="0"/>
                                           <a:ea typeface="Cambria Math" panose="02040503050406030204" pitchFamily="18" charset="0"/>
                                         </a:rPr>
-                                        <m:t>0</m:t>
+                                        <m:t>∗</m:t>
                                       </m:r>
-                                    </m:sub>
-                                  </m:sSub>
-                                </m:e>
-                              </m:d>
-                            </m:fName>
-                            <m:e>
-                              <m:r>
-                                <a:rPr lang="en-US" i="1">
-                                  <a:latin typeface="Cambria Math" panose="02040503050406030204" pitchFamily="18" charset="0"/>
-                                  <a:ea typeface="Cambria Math" panose="02040503050406030204" pitchFamily="18" charset="0"/>
-                                </a:rPr>
-                                <m:t>𝑝</m:t>
-                              </m:r>
-                              <m:d>
-                                <m:dPr>
-                                  <m:ctrlPr>
-                                    <a:rPr lang="en-US" i="1">
-                                      <a:latin typeface="Cambria Math" panose="02040503050406030204" pitchFamily="18" charset="0"/>
-                                      <a:ea typeface="Cambria Math" panose="02040503050406030204" pitchFamily="18" charset="0"/>
-                                    </a:rPr>
-                                  </m:ctrlPr>
-                                </m:dPr>
-                                <m:e>
-                                  <m:r>
-                                    <a:rPr lang="en-US" i="1">
-                                      <a:latin typeface="Cambria Math" panose="02040503050406030204" pitchFamily="18" charset="0"/>
-                                      <a:ea typeface="Cambria Math" panose="02040503050406030204" pitchFamily="18" charset="0"/>
-                                    </a:rPr>
-                                    <m:t>𝑦</m:t>
-                                  </m:r>
+                                    </m:sup>
+                                  </m:sSup>
                                 </m:e>
                                 <m:e>
                                   <m:acc>
                                     <m:accPr>
                                       <m:chr m:val="̂"/>
                                       <m:ctrlPr>
-                                        <a:rPr lang="en-US" i="1">
+                                        <a:rPr lang="en-US" b="0" i="1" smtClean="0">
                                           <a:latin typeface="Cambria Math" panose="02040503050406030204" pitchFamily="18" charset="0"/>
                                           <a:ea typeface="Cambria Math" panose="02040503050406030204" pitchFamily="18" charset="0"/>
                                         </a:rPr>
@@ -8322,6 +8099,52 @@
                                   </m:acc>
                                 </m:e>
                               </m:d>
+                            </m:fName>
+                            <m:e>
+                              <m:r>
+                                <a:rPr lang="en-US" i="1">
+                                  <a:latin typeface="Cambria Math" panose="02040503050406030204" pitchFamily="18" charset="0"/>
+                                </a:rPr>
+                                <m:t>𝑓</m:t>
+                              </m:r>
+                              <m:r>
+                                <a:rPr lang="en-US" i="1">
+                                  <a:latin typeface="Cambria Math" panose="02040503050406030204" pitchFamily="18" charset="0"/>
+                                </a:rPr>
+                                <m:t>(</m:t>
+                              </m:r>
+                              <m:sSup>
+                                <m:sSupPr>
+                                  <m:ctrlPr>
+                                    <a:rPr lang="en-US" b="0" i="1" smtClean="0">
+                                      <a:latin typeface="Cambria Math" panose="02040503050406030204" pitchFamily="18" charset="0"/>
+                                    </a:rPr>
+                                  </m:ctrlPr>
+                                </m:sSupPr>
+                                <m:e>
+                                  <m:r>
+                                    <a:rPr lang="en-US" i="1">
+                                      <a:latin typeface="Cambria Math" panose="02040503050406030204" pitchFamily="18" charset="0"/>
+                                    </a:rPr>
+                                    <m:t>𝑦</m:t>
+                                  </m:r>
+                                </m:e>
+                                <m:sup>
+                                  <m:r>
+                                    <a:rPr lang="en-US" b="0" i="1" smtClean="0">
+                                      <a:latin typeface="Cambria Math" panose="02040503050406030204" pitchFamily="18" charset="0"/>
+                                    </a:rPr>
+                                    <m:t>∗</m:t>
+                                  </m:r>
+                                </m:sup>
+                              </m:sSup>
+                              <m:r>
+                                <a:rPr lang="en-US" i="1">
+                                  <a:latin typeface="Cambria Math" panose="02040503050406030204" pitchFamily="18" charset="0"/>
+                                  <a:ea typeface="Cambria Math" panose="02040503050406030204" pitchFamily="18" charset="0"/>
+                                </a:rPr>
+                                <m:t>)</m:t>
+                              </m:r>
                             </m:e>
                           </m:func>
                           <m:r>
@@ -8331,13 +8154,34 @@
                             </a:rPr>
                             <m:t>𝑑</m:t>
                           </m:r>
-                          <m:r>
-                            <a:rPr lang="en-US" i="1">
-                              <a:latin typeface="Cambria Math" panose="02040503050406030204" pitchFamily="18" charset="0"/>
-                              <a:ea typeface="Cambria Math" panose="02040503050406030204" pitchFamily="18" charset="0"/>
-                            </a:rPr>
-                            <m:t>𝑦</m:t>
-                          </m:r>
+                          <m:sSup>
+                            <m:sSupPr>
+                              <m:ctrlPr>
+                                <a:rPr lang="en-US" b="0" i="1" smtClean="0">
+                                  <a:latin typeface="Cambria Math" panose="02040503050406030204" pitchFamily="18" charset="0"/>
+                                  <a:ea typeface="Cambria Math" panose="02040503050406030204" pitchFamily="18" charset="0"/>
+                                </a:rPr>
+                              </m:ctrlPr>
+                            </m:sSupPr>
+                            <m:e>
+                              <m:r>
+                                <a:rPr lang="en-US" i="1">
+                                  <a:latin typeface="Cambria Math" panose="02040503050406030204" pitchFamily="18" charset="0"/>
+                                  <a:ea typeface="Cambria Math" panose="02040503050406030204" pitchFamily="18" charset="0"/>
+                                </a:rPr>
+                                <m:t>𝑦</m:t>
+                              </m:r>
+                            </m:e>
+                            <m:sup>
+                              <m:r>
+                                <a:rPr lang="en-US" b="0" i="1" smtClean="0">
+                                  <a:latin typeface="Cambria Math" panose="02040503050406030204" pitchFamily="18" charset="0"/>
+                                  <a:ea typeface="Cambria Math" panose="02040503050406030204" pitchFamily="18" charset="0"/>
+                                </a:rPr>
+                                <m:t>∗</m:t>
+                              </m:r>
+                            </m:sup>
+                          </m:sSup>
                         </m:e>
                       </m:nary>
                     </m:oMath>
@@ -8356,182 +8200,380 @@
                 <a:pPr lvl="2" indent="-342900"/>
                 <a14:m>
                   <m:oMath xmlns:m="http://schemas.openxmlformats.org/officeDocument/2006/math">
-                    <m:r>
-                      <a:rPr lang="en-US" i="1">
-                        <a:latin typeface="Cambria Math" panose="02040503050406030204" pitchFamily="18" charset="0"/>
-                        <a:ea typeface="Cambria Math" panose="02040503050406030204" pitchFamily="18" charset="0"/>
-                      </a:rPr>
-                      <m:t>𝑝</m:t>
-                    </m:r>
-                    <m:d>
-                      <m:dPr>
+                    <m:sSup>
+                      <m:sSupPr>
+                        <m:ctrlPr>
+                          <a:rPr lang="en-US" i="1">
+                            <a:latin typeface="Cambria Math" panose="02040503050406030204" pitchFamily="18" charset="0"/>
+                          </a:rPr>
+                        </m:ctrlPr>
+                      </m:sSupPr>
+                      <m:e>
+                        <m:r>
+                          <a:rPr lang="en-US" i="1">
+                            <a:latin typeface="Cambria Math" panose="02040503050406030204" pitchFamily="18" charset="0"/>
+                          </a:rPr>
+                          <m:t>𝑦</m:t>
+                        </m:r>
+                      </m:e>
+                      <m:sup>
+                        <m:r>
+                          <a:rPr lang="en-US" i="1">
+                            <a:latin typeface="Cambria Math" panose="02040503050406030204" pitchFamily="18" charset="0"/>
+                          </a:rPr>
+                          <m:t>∗</m:t>
+                        </m:r>
+                      </m:sup>
+                    </m:sSup>
+                  </m:oMath>
+                </a14:m>
+                <a:r>
+                  <a:rPr lang="en-US" i="1" dirty="0" smtClean="0">
+                    <a:latin typeface="Cambria Math" panose="02040503050406030204" pitchFamily="18" charset="0"/>
+                  </a:rPr>
+                  <a:t> </a:t>
+                </a:r>
+                <a:r>
+                  <a:rPr lang="en-US" dirty="0" smtClean="0">
+                    <a:latin typeface="Cambria Math" panose="02040503050406030204" pitchFamily="18" charset="0"/>
+                  </a:rPr>
+                  <a:t>is some future data</a:t>
+                </a:r>
+                <a:endParaRPr lang="en-US" i="1" dirty="0">
+                  <a:latin typeface="Cambria Math" panose="02040503050406030204" pitchFamily="18" charset="0"/>
+                </a:endParaRPr>
+              </a:p>
+              <a:p>
+                <a:pPr marL="400050" lvl="1" indent="0">
+                  <a:buNone/>
+                </a:pPr>
+                <a:r>
+                  <a:rPr lang="en-US" dirty="0" smtClean="0">
+                    <a:latin typeface="Cambria Math" panose="02040503050406030204" pitchFamily="18" charset="0"/>
+                  </a:rPr>
+                  <a:t>Then</a:t>
+                </a:r>
+                <a:endParaRPr lang="en-GB" dirty="0" smtClean="0"/>
+              </a:p>
+              <a:p>
+                <a:pPr marL="400050" lvl="1" indent="0">
+                  <a:buNone/>
+                </a:pPr>
+                <a14:m>
+                  <m:oMathPara xmlns:m="http://schemas.openxmlformats.org/officeDocument/2006/math">
+                    <m:oMathParaPr>
+                      <m:jc m:val="centerGroup"/>
+                    </m:oMathParaPr>
+                    <m:oMath xmlns:m="http://schemas.openxmlformats.org/officeDocument/2006/math">
+                      <m:r>
+                        <m:rPr>
+                          <m:sty m:val="p"/>
+                        </m:rPr>
+                        <a:rPr lang="en-US" b="0" i="0" smtClean="0">
+                          <a:latin typeface="Cambria Math" panose="02040503050406030204" pitchFamily="18" charset="0"/>
+                        </a:rPr>
+                        <m:t>expected</m:t>
+                      </m:r>
+                      <m:r>
+                        <a:rPr lang="en-US" b="0" i="0" smtClean="0">
+                          <a:latin typeface="Cambria Math" panose="02040503050406030204" pitchFamily="18" charset="0"/>
+                        </a:rPr>
+                        <m:t> </m:t>
+                      </m:r>
+                      <m:r>
+                        <m:rPr>
+                          <m:sty m:val="p"/>
+                        </m:rPr>
+                        <a:rPr lang="en-US" b="0" i="0" smtClean="0">
+                          <a:latin typeface="Cambria Math" panose="02040503050406030204" pitchFamily="18" charset="0"/>
+                        </a:rPr>
+                        <m:t>predictive</m:t>
+                      </m:r>
+                      <m:r>
+                        <a:rPr lang="en-US" b="0" i="0" smtClean="0">
+                          <a:latin typeface="Cambria Math" panose="02040503050406030204" pitchFamily="18" charset="0"/>
+                        </a:rPr>
+                        <m:t> </m:t>
+                      </m:r>
+                      <m:r>
+                        <m:rPr>
+                          <m:sty m:val="p"/>
+                        </m:rPr>
+                        <a:rPr lang="en-US" b="0" i="0" smtClean="0">
+                          <a:latin typeface="Cambria Math" panose="02040503050406030204" pitchFamily="18" charset="0"/>
+                        </a:rPr>
+                        <m:t>log</m:t>
+                      </m:r>
+                      <m:r>
+                        <a:rPr lang="en-US" b="0" i="0" smtClean="0">
+                          <a:latin typeface="Cambria Math" panose="02040503050406030204" pitchFamily="18" charset="0"/>
+                        </a:rPr>
+                        <m:t>−</m:t>
+                      </m:r>
+                      <m:r>
+                        <m:rPr>
+                          <m:sty m:val="p"/>
+                        </m:rPr>
+                        <a:rPr lang="en-US" b="0" i="0" smtClean="0">
+                          <a:latin typeface="Cambria Math" panose="02040503050406030204" pitchFamily="18" charset="0"/>
+                        </a:rPr>
+                        <m:t>probability</m:t>
+                      </m:r>
+                      <m:r>
+                        <a:rPr lang="en-US" i="1">
+                          <a:latin typeface="Cambria Math" panose="02040503050406030204" pitchFamily="18" charset="0"/>
+                        </a:rPr>
+                        <m:t>=</m:t>
+                      </m:r>
+                      <m:nary>
+                        <m:naryPr>
+                          <m:chr m:val="∑"/>
+                          <m:ctrlPr>
+                            <a:rPr lang="en-US" i="1" smtClean="0">
+                              <a:latin typeface="Cambria Math" panose="02040503050406030204" pitchFamily="18" charset="0"/>
+                            </a:rPr>
+                          </m:ctrlPr>
+                        </m:naryPr>
+                        <m:sub>
+                          <m:r>
+                            <m:rPr>
+                              <m:brk m:alnAt="23"/>
+                            </m:rPr>
+                            <a:rPr lang="en-US" b="0" i="1" smtClean="0">
+                              <a:latin typeface="Cambria Math" panose="02040503050406030204" pitchFamily="18" charset="0"/>
+                            </a:rPr>
+                            <m:t>𝑗</m:t>
+                          </m:r>
+                          <m:r>
+                            <a:rPr lang="en-US" b="0" i="1" smtClean="0">
+                              <a:latin typeface="Cambria Math" panose="02040503050406030204" pitchFamily="18" charset="0"/>
+                            </a:rPr>
+                            <m:t>=1</m:t>
+                          </m:r>
+                        </m:sub>
+                        <m:sup>
+                          <m:r>
+                            <a:rPr lang="en-US" b="0" i="1" smtClean="0">
+                              <a:latin typeface="Cambria Math" panose="02040503050406030204" pitchFamily="18" charset="0"/>
+                            </a:rPr>
+                            <m:t>𝐽</m:t>
+                          </m:r>
+                        </m:sup>
+                        <m:e>
+                          <m:r>
+                            <m:rPr>
+                              <m:sty m:val="p"/>
+                            </m:rPr>
+                            <a:rPr lang="en-US" b="0" i="0" smtClean="0">
+                              <a:latin typeface="Cambria Math" panose="02040503050406030204" pitchFamily="18" charset="0"/>
+                            </a:rPr>
+                            <m:t>log</m:t>
+                          </m:r>
+                          <m:r>
+                            <a:rPr lang="en-US" b="0" i="1" smtClean="0">
+                              <a:latin typeface="Cambria Math" panose="02040503050406030204" pitchFamily="18" charset="0"/>
+                            </a:rPr>
+                            <m:t>⁡(</m:t>
+                          </m:r>
+                          <m:r>
+                            <a:rPr lang="en-US" i="1">
+                              <a:latin typeface="Cambria Math" panose="02040503050406030204" pitchFamily="18" charset="0"/>
+                              <a:ea typeface="Cambria Math" panose="02040503050406030204" pitchFamily="18" charset="0"/>
+                            </a:rPr>
+                            <m:t>𝑝</m:t>
+                          </m:r>
+                          <m:d>
+                            <m:dPr>
+                              <m:ctrlPr>
+                                <a:rPr lang="en-US" i="1">
+                                  <a:latin typeface="Cambria Math" panose="02040503050406030204" pitchFamily="18" charset="0"/>
+                                </a:rPr>
+                              </m:ctrlPr>
+                            </m:dPr>
+                            <m:e>
+                              <m:sSub>
+                                <m:sSubPr>
+                                  <m:ctrlPr>
+                                    <a:rPr lang="en-US" b="0" i="1" smtClean="0">
+                                      <a:latin typeface="Cambria Math" panose="02040503050406030204" pitchFamily="18" charset="0"/>
+                                      <a:ea typeface="Cambria Math" panose="02040503050406030204" pitchFamily="18" charset="0"/>
+                                    </a:rPr>
+                                  </m:ctrlPr>
+                                </m:sSubPr>
+                                <m:e>
+                                  <m:r>
+                                    <a:rPr lang="en-US" i="1">
+                                      <a:latin typeface="Cambria Math" panose="02040503050406030204" pitchFamily="18" charset="0"/>
+                                      <a:ea typeface="Cambria Math" panose="02040503050406030204" pitchFamily="18" charset="0"/>
+                                    </a:rPr>
+                                    <m:t>𝑦</m:t>
+                                  </m:r>
+                                </m:e>
+                                <m:sub>
+                                  <m:r>
+                                    <a:rPr lang="en-US" b="0" i="1" smtClean="0">
+                                      <a:latin typeface="Cambria Math" panose="02040503050406030204" pitchFamily="18" charset="0"/>
+                                      <a:ea typeface="Cambria Math" panose="02040503050406030204" pitchFamily="18" charset="0"/>
+                                    </a:rPr>
+                                    <m:t>𝑗</m:t>
+                                  </m:r>
+                                </m:sub>
+                              </m:sSub>
+                            </m:e>
+                            <m:e>
+                              <m:acc>
+                                <m:accPr>
+                                  <m:chr m:val="̂"/>
+                                  <m:ctrlPr>
+                                    <a:rPr lang="en-US" i="1">
+                                      <a:latin typeface="Cambria Math" panose="02040503050406030204" pitchFamily="18" charset="0"/>
+                                      <a:ea typeface="Cambria Math" panose="02040503050406030204" pitchFamily="18" charset="0"/>
+                                    </a:rPr>
+                                  </m:ctrlPr>
+                                </m:accPr>
+                                <m:e>
+                                  <m:r>
+                                    <a:rPr lang="en-US" b="1">
+                                      <a:latin typeface="Cambria Math" panose="02040503050406030204" pitchFamily="18" charset="0"/>
+                                      <a:ea typeface="Cambria Math" panose="02040503050406030204" pitchFamily="18" charset="0"/>
+                                    </a:rPr>
+                                    <m:t>𝛉</m:t>
+                                  </m:r>
+                                </m:e>
+                              </m:acc>
+                            </m:e>
+                          </m:d>
+                          <m:r>
+                            <a:rPr lang="en-US" b="1" i="1" smtClean="0">
+                              <a:latin typeface="Cambria Math" panose="02040503050406030204" pitchFamily="18" charset="0"/>
+                              <a:ea typeface="Cambria Math" panose="02040503050406030204" pitchFamily="18" charset="0"/>
+                            </a:rPr>
+                            <m:t>)</m:t>
+                          </m:r>
+                        </m:e>
+                      </m:nary>
+                    </m:oMath>
+                  </m:oMathPara>
+                </a14:m>
+                <a:endParaRPr lang="en-GB" dirty="0" smtClean="0"/>
+              </a:p>
+              <a:p>
+                <a:pPr lvl="1" indent="-342900"/>
+                <a:r>
+                  <a:rPr lang="en-US" dirty="0" smtClean="0"/>
+                  <a:t>Where</a:t>
+                </a:r>
+              </a:p>
+              <a:p>
+                <a:pPr lvl="2" indent="-342900"/>
+                <a14:m>
+                  <m:oMath xmlns:m="http://schemas.openxmlformats.org/officeDocument/2006/math">
+                    <m:sSub>
+                      <m:sSubPr>
                         <m:ctrlPr>
                           <a:rPr lang="en-US" i="1">
                             <a:latin typeface="Cambria Math" panose="02040503050406030204" pitchFamily="18" charset="0"/>
                             <a:ea typeface="Cambria Math" panose="02040503050406030204" pitchFamily="18" charset="0"/>
                           </a:rPr>
                         </m:ctrlPr>
-                      </m:dPr>
+                      </m:sSubPr>
                       <m:e>
-                        <m:sSup>
-                          <m:sSupPr>
-                            <m:ctrlPr>
-                              <a:rPr lang="en-US" i="1">
-                                <a:latin typeface="Cambria Math" panose="02040503050406030204" pitchFamily="18" charset="0"/>
-                                <a:ea typeface="Cambria Math" panose="02040503050406030204" pitchFamily="18" charset="0"/>
-                              </a:rPr>
-                            </m:ctrlPr>
-                          </m:sSupPr>
-                          <m:e>
-                            <m:r>
-                              <a:rPr lang="en-US" i="1">
-                                <a:latin typeface="Cambria Math" panose="02040503050406030204" pitchFamily="18" charset="0"/>
-                                <a:ea typeface="Cambria Math" panose="02040503050406030204" pitchFamily="18" charset="0"/>
-                              </a:rPr>
-                              <m:t>𝑦</m:t>
-                            </m:r>
-                          </m:e>
-                          <m:sup>
-                            <m:r>
-                              <a:rPr lang="en-US" i="1">
-                                <a:latin typeface="Cambria Math" panose="02040503050406030204" pitchFamily="18" charset="0"/>
-                                <a:ea typeface="Cambria Math" panose="02040503050406030204" pitchFamily="18" charset="0"/>
-                              </a:rPr>
-                              <m:t>∗</m:t>
-                            </m:r>
-                          </m:sup>
-                        </m:sSup>
+                        <m:r>
+                          <a:rPr lang="en-US" i="1">
+                            <a:latin typeface="Cambria Math" panose="02040503050406030204" pitchFamily="18" charset="0"/>
+                            <a:ea typeface="Cambria Math" panose="02040503050406030204" pitchFamily="18" charset="0"/>
+                          </a:rPr>
+                          <m:t>𝑦</m:t>
+                        </m:r>
                       </m:e>
-                      <m:e>
-                        <m:acc>
-                          <m:accPr>
-                            <m:chr m:val="̂"/>
-                            <m:ctrlPr>
-                              <a:rPr lang="en-US" i="1">
-                                <a:latin typeface="Cambria Math" panose="02040503050406030204" pitchFamily="18" charset="0"/>
-                                <a:ea typeface="Cambria Math" panose="02040503050406030204" pitchFamily="18" charset="0"/>
-                              </a:rPr>
-                            </m:ctrlPr>
-                          </m:accPr>
-                          <m:e>
-                            <m:r>
-                              <a:rPr lang="en-US" b="1">
-                                <a:latin typeface="Cambria Math" panose="02040503050406030204" pitchFamily="18" charset="0"/>
-                                <a:ea typeface="Cambria Math" panose="02040503050406030204" pitchFamily="18" charset="0"/>
-                              </a:rPr>
-                              <m:t>𝛉</m:t>
-                            </m:r>
-                          </m:e>
-                        </m:acc>
-                      </m:e>
-                    </m:d>
+                      <m:sub>
+                        <m:r>
+                          <a:rPr lang="en-US" i="1">
+                            <a:latin typeface="Cambria Math" panose="02040503050406030204" pitchFamily="18" charset="0"/>
+                            <a:ea typeface="Cambria Math" panose="02040503050406030204" pitchFamily="18" charset="0"/>
+                          </a:rPr>
+                          <m:t>𝑗</m:t>
+                        </m:r>
+                      </m:sub>
+                    </m:sSub>
                   </m:oMath>
                 </a14:m>
                 <a:r>
                   <a:rPr lang="en-GB" dirty="0" smtClean="0"/>
-                  <a:t> is your predictive distribution for a new observation</a:t>
+                  <a:t> is some data that were “held out” when estimating parameters </a:t>
                 </a:r>
-              </a:p>
-              <a:p>
-                <a:pPr lvl="2" indent="-342900"/>
                 <a14:m>
                   <m:oMath xmlns:m="http://schemas.openxmlformats.org/officeDocument/2006/math">
-                    <m:r>
-                      <a:rPr lang="en-US" i="1">
-                        <a:latin typeface="Cambria Math" panose="02040503050406030204" pitchFamily="18" charset="0"/>
-                      </a:rPr>
-                      <m:t>𝑓</m:t>
-                    </m:r>
-                    <m:d>
-                      <m:dPr>
+                    <m:acc>
+                      <m:accPr>
+                        <m:chr m:val="̂"/>
                         <m:ctrlPr>
                           <a:rPr lang="en-US" i="1">
                             <a:latin typeface="Cambria Math" panose="02040503050406030204" pitchFamily="18" charset="0"/>
+                            <a:ea typeface="Cambria Math" panose="02040503050406030204" pitchFamily="18" charset="0"/>
                           </a:rPr>
                         </m:ctrlPr>
-                      </m:dPr>
+                      </m:accPr>
                       <m:e>
-                        <m:sSup>
-                          <m:sSupPr>
-                            <m:ctrlPr>
-                              <a:rPr lang="en-US" i="1">
-                                <a:latin typeface="Cambria Math" panose="02040503050406030204" pitchFamily="18" charset="0"/>
-                                <a:ea typeface="Cambria Math" panose="02040503050406030204" pitchFamily="18" charset="0"/>
-                              </a:rPr>
-                            </m:ctrlPr>
-                          </m:sSupPr>
-                          <m:e>
-                            <m:r>
-                              <a:rPr lang="en-US" i="1">
-                                <a:latin typeface="Cambria Math" panose="02040503050406030204" pitchFamily="18" charset="0"/>
-                                <a:ea typeface="Cambria Math" panose="02040503050406030204" pitchFamily="18" charset="0"/>
-                              </a:rPr>
-                              <m:t>𝑦</m:t>
-                            </m:r>
-                          </m:e>
-                          <m:sup>
-                            <m:r>
-                              <a:rPr lang="en-US" i="1">
-                                <a:latin typeface="Cambria Math" panose="02040503050406030204" pitchFamily="18" charset="0"/>
-                                <a:ea typeface="Cambria Math" panose="02040503050406030204" pitchFamily="18" charset="0"/>
-                              </a:rPr>
-                              <m:t>∗</m:t>
-                            </m:r>
-                          </m:sup>
-                        </m:sSup>
+                        <m:r>
+                          <a:rPr lang="en-US" b="1">
+                            <a:latin typeface="Cambria Math" panose="02040503050406030204" pitchFamily="18" charset="0"/>
+                            <a:ea typeface="Cambria Math" panose="02040503050406030204" pitchFamily="18" charset="0"/>
+                          </a:rPr>
+                          <m:t>𝛉</m:t>
+                        </m:r>
                       </m:e>
-                      <m:e>
-                        <m:sSub>
-                          <m:sSubPr>
-                            <m:ctrlPr>
-                              <a:rPr lang="en-US" b="1" i="1">
-                                <a:latin typeface="Cambria Math" panose="02040503050406030204" pitchFamily="18" charset="0"/>
-                                <a:ea typeface="Cambria Math" panose="02040503050406030204" pitchFamily="18" charset="0"/>
-                              </a:rPr>
-                            </m:ctrlPr>
-                          </m:sSubPr>
-                          <m:e>
-                            <m:r>
-                              <a:rPr lang="en-US" b="1">
-                                <a:latin typeface="Cambria Math" panose="02040503050406030204" pitchFamily="18" charset="0"/>
-                                <a:ea typeface="Cambria Math" panose="02040503050406030204" pitchFamily="18" charset="0"/>
-                              </a:rPr>
-                              <m:t>𝛉</m:t>
-                            </m:r>
-                          </m:e>
-                          <m:sub>
-                            <m:r>
-                              <a:rPr lang="en-US">
-                                <a:latin typeface="Cambria Math" panose="02040503050406030204" pitchFamily="18" charset="0"/>
-                                <a:ea typeface="Cambria Math" panose="02040503050406030204" pitchFamily="18" charset="0"/>
-                              </a:rPr>
-                              <m:t>0</m:t>
-                            </m:r>
-                          </m:sub>
-                        </m:sSub>
-                      </m:e>
-                    </m:d>
+                    </m:acc>
                   </m:oMath>
                 </a14:m>
-                <a:r>
-                  <a:rPr lang="en-GB" dirty="0" smtClean="0"/>
-                  <a:t> is the true probability of </a:t>
-                </a:r>
-              </a:p>
-              <a:p>
-                <a:pPr lvl="1" indent="-342900"/>
                 <a:endParaRPr lang="en-GB" dirty="0" smtClean="0"/>
               </a:p>
               <a:p>
                 <a:pPr marL="400050" lvl="1" indent="0">
                   <a:buNone/>
                 </a:pPr>
+                <a:r>
+                  <a:rPr lang="en-US" dirty="0" smtClean="0"/>
+                  <a:t>More reading: </a:t>
+                </a:r>
+                <a:r>
+                  <a:rPr lang="en-GB" dirty="0" err="1"/>
+                  <a:t>Gelman</a:t>
+                </a:r>
+                <a:r>
+                  <a:rPr lang="en-GB" dirty="0"/>
+                  <a:t>, A., Hwang, J. &amp; </a:t>
+                </a:r>
+                <a:r>
+                  <a:rPr lang="en-GB" dirty="0" err="1"/>
+                  <a:t>Vehtari</a:t>
+                </a:r>
+                <a:r>
+                  <a:rPr lang="en-GB" dirty="0"/>
+                  <a:t>, A. (2014). Understanding predictive information criteria for Bayesian models. </a:t>
+                </a:r>
+                <a:r>
+                  <a:rPr lang="en-GB" i="1" dirty="0"/>
+                  <a:t>Stat. </a:t>
+                </a:r>
+                <a:r>
+                  <a:rPr lang="en-GB" i="1" dirty="0" err="1"/>
+                  <a:t>Comput</a:t>
+                </a:r>
+                <a:r>
+                  <a:rPr lang="en-GB" i="1" dirty="0"/>
+                  <a:t>.</a:t>
+                </a:r>
+                <a:r>
+                  <a:rPr lang="en-GB" dirty="0"/>
+                  <a:t>, 24, 997–1016.</a:t>
+                </a:r>
                 <a:endParaRPr lang="en-GB" dirty="0"/>
               </a:p>
             </p:txBody>
           </p:sp>
         </mc:Choice>
-        <mc:Fallback xmlns="">
+        <mc:Fallback>
           <p:sp>
             <p:nvSpPr>
               <p:cNvPr id="3" name="Content Placeholder 2"/>
@@ -8546,7 +8588,7 @@
               <a:blipFill>
                 <a:blip r:embed="rId2"/>
                 <a:stretch>
-                  <a:fillRect l="-1424" t="-1026" r="-814"/>
+                  <a:fillRect l="-1424" t="-2359" r="-475" b="-1026"/>
                 </a:stretch>
               </a:blipFill>
             </p:spPr>
@@ -8640,6 +8682,9 @@
               </a:bodyPr>
               <a:lstStyle/>
               <a:p>
+                <a:pPr marL="0" indent="0">
+                  <a:buNone/>
+                </a:pPr>
                 <a:r>
                   <a:rPr lang="en-US" dirty="0" smtClean="0"/>
                   <a:t>Generalized linear models</a:t>
@@ -8656,11 +8701,7 @@
                 <a:pPr lvl="1"/>
                 <a:r>
                   <a:rPr lang="en-US" dirty="0" smtClean="0"/>
-                  <a:t>Specify </a:t>
-                </a:r>
-                <a:r>
-                  <a:rPr lang="en-US" dirty="0" smtClean="0"/>
-                  <a:t>linear predictor</a:t>
+                  <a:t>Specify linear predictor</a:t>
                 </a:r>
               </a:p>
               <a:p>
@@ -8676,7 +8717,6 @@
                   <a:rPr lang="en-US" dirty="0" smtClean="0"/>
                   <a:t>Calculates expected response given linear predictor</a:t>
                 </a:r>
-                <a:endParaRPr lang="en-US" dirty="0" smtClean="0"/>
               </a:p>
               <a:p>
                 <a:pPr marL="457200" lvl="1" indent="0" algn="ctr">
@@ -8929,7 +8969,7 @@
               <a:blipFill>
                 <a:blip r:embed="rId2"/>
                 <a:stretch>
-                  <a:fillRect l="-1085" t="-1641"/>
+                  <a:fillRect l="-1220" t="-1641"/>
                 </a:stretch>
               </a:blipFill>
             </p:spPr>
@@ -10368,13 +10408,8 @@
             <a:pPr lvl="1"/>
             <a:r>
               <a:rPr lang="en-US" dirty="0" smtClean="0"/>
-              <a:t>Cannot </a:t>
+              <a:t>Cannot cut-paste any code from other students</a:t>
             </a:r>
-            <a:r>
-              <a:rPr lang="en-US" dirty="0" smtClean="0"/>
-              <a:t>cut-paste any code from other students</a:t>
-            </a:r>
-            <a:endParaRPr lang="en-US" dirty="0" smtClean="0"/>
           </a:p>
           <a:p>
             <a:pPr lvl="2"/>
@@ -10496,8 +10531,8 @@
           </a:p>
         </p:txBody>
       </p:sp>
-      <mc:AlternateContent xmlns:mc="http://schemas.openxmlformats.org/markup-compatibility/2006">
-        <mc:Choice xmlns:a14="http://schemas.microsoft.com/office/drawing/2010/main" Requires="a14">
+      <mc:AlternateContent xmlns:mc="http://schemas.openxmlformats.org/markup-compatibility/2006" xmlns:a14="http://schemas.microsoft.com/office/drawing/2010/main">
+        <mc:Choice Requires="a14">
           <p:graphicFrame>
             <p:nvGraphicFramePr>
               <p:cNvPr id="6" name="Table 5"/>
@@ -11380,7 +11415,6 @@
                             <a:rPr lang="en-US" dirty="0" smtClean="0"/>
                             <a:t>&gt;0</a:t>
                           </a:r>
-                          <a:endParaRPr lang="en-US" dirty="0" smtClean="0"/>
                         </a:p>
                       </a:txBody>
                       <a:tcPr/>
@@ -11426,7 +11460,7 @@
             </a:graphic>
           </p:graphicFrame>
         </mc:Choice>
-        <mc:Fallback>
+        <mc:Fallback xmlns="">
           <p:graphicFrame>
             <p:nvGraphicFramePr>
               <p:cNvPr id="6" name="Table 5"/>
@@ -12111,8 +12145,8 @@
           </a:p>
         </p:txBody>
       </p:sp>
-      <mc:AlternateContent xmlns:mc="http://schemas.openxmlformats.org/markup-compatibility/2006">
-        <mc:Choice xmlns:a14="http://schemas.microsoft.com/office/drawing/2010/main" Requires="a14">
+      <mc:AlternateContent xmlns:mc="http://schemas.openxmlformats.org/markup-compatibility/2006" xmlns:a14="http://schemas.microsoft.com/office/drawing/2010/main">
+        <mc:Choice Requires="a14">
           <p:graphicFrame>
             <p:nvGraphicFramePr>
               <p:cNvPr id="4" name="Table 3"/>
@@ -12867,7 +12901,7 @@
             </a:graphic>
           </p:graphicFrame>
         </mc:Choice>
-        <mc:Fallback>
+        <mc:Fallback xmlns="">
           <p:graphicFrame>
             <p:nvGraphicFramePr>
               <p:cNvPr id="4" name="Table 3"/>
@@ -14160,7 +14194,327 @@
   <p:timing>
     <p:tnLst>
       <p:par>
-        <p:cTn id="1" dur="indefinite" restart="never" nodeType="tmRoot"/>
+        <p:cTn id="1" dur="indefinite" restart="never" nodeType="tmRoot">
+          <p:childTnLst>
+            <p:seq concurrent="1" nextAc="seek">
+              <p:cTn id="2" dur="indefinite" nodeType="mainSeq">
+                <p:childTnLst>
+                  <p:par>
+                    <p:cTn id="3" fill="hold">
+                      <p:stCondLst>
+                        <p:cond delay="indefinite"/>
+                      </p:stCondLst>
+                      <p:childTnLst>
+                        <p:par>
+                          <p:cTn id="4" fill="hold">
+                            <p:stCondLst>
+                              <p:cond delay="0"/>
+                            </p:stCondLst>
+                            <p:childTnLst>
+                              <p:par>
+                                <p:cTn id="5" presetID="1" presetClass="entr" presetSubtype="0" fill="hold" nodeType="clickEffect">
+                                  <p:stCondLst>
+                                    <p:cond delay="0"/>
+                                  </p:stCondLst>
+                                  <p:childTnLst>
+                                    <p:set>
+                                      <p:cBhvr>
+                                        <p:cTn id="6" dur="1" fill="hold">
+                                          <p:stCondLst>
+                                            <p:cond delay="0"/>
+                                          </p:stCondLst>
+                                        </p:cTn>
+                                        <p:tgtEl>
+                                          <p:spTgt spid="3">
+                                            <p:txEl>
+                                              <p:pRg st="2" end="2"/>
+                                            </p:txEl>
+                                          </p:spTgt>
+                                        </p:tgtEl>
+                                        <p:attrNameLst>
+                                          <p:attrName>style.visibility</p:attrName>
+                                        </p:attrNameLst>
+                                      </p:cBhvr>
+                                      <p:to>
+                                        <p:strVal val="visible"/>
+                                      </p:to>
+                                    </p:set>
+                                  </p:childTnLst>
+                                </p:cTn>
+                              </p:par>
+                              <p:par>
+                                <p:cTn id="7" presetID="1" presetClass="entr" presetSubtype="0" fill="hold" nodeType="withEffect">
+                                  <p:stCondLst>
+                                    <p:cond delay="0"/>
+                                  </p:stCondLst>
+                                  <p:childTnLst>
+                                    <p:set>
+                                      <p:cBhvr>
+                                        <p:cTn id="8" dur="1" fill="hold">
+                                          <p:stCondLst>
+                                            <p:cond delay="0"/>
+                                          </p:stCondLst>
+                                        </p:cTn>
+                                        <p:tgtEl>
+                                          <p:spTgt spid="3">
+                                            <p:txEl>
+                                              <p:pRg st="3" end="3"/>
+                                            </p:txEl>
+                                          </p:spTgt>
+                                        </p:tgtEl>
+                                        <p:attrNameLst>
+                                          <p:attrName>style.visibility</p:attrName>
+                                        </p:attrNameLst>
+                                      </p:cBhvr>
+                                      <p:to>
+                                        <p:strVal val="visible"/>
+                                      </p:to>
+                                    </p:set>
+                                  </p:childTnLst>
+                                </p:cTn>
+                              </p:par>
+                              <p:par>
+                                <p:cTn id="9" presetID="1" presetClass="entr" presetSubtype="0" fill="hold" nodeType="withEffect">
+                                  <p:stCondLst>
+                                    <p:cond delay="0"/>
+                                  </p:stCondLst>
+                                  <p:childTnLst>
+                                    <p:set>
+                                      <p:cBhvr>
+                                        <p:cTn id="10" dur="1" fill="hold">
+                                          <p:stCondLst>
+                                            <p:cond delay="0"/>
+                                          </p:stCondLst>
+                                        </p:cTn>
+                                        <p:tgtEl>
+                                          <p:spTgt spid="3">
+                                            <p:txEl>
+                                              <p:pRg st="4" end="4"/>
+                                            </p:txEl>
+                                          </p:spTgt>
+                                        </p:tgtEl>
+                                        <p:attrNameLst>
+                                          <p:attrName>style.visibility</p:attrName>
+                                        </p:attrNameLst>
+                                      </p:cBhvr>
+                                      <p:to>
+                                        <p:strVal val="visible"/>
+                                      </p:to>
+                                    </p:set>
+                                  </p:childTnLst>
+                                </p:cTn>
+                              </p:par>
+                              <p:par>
+                                <p:cTn id="11" presetID="1" presetClass="entr" presetSubtype="0" fill="hold" nodeType="withEffect">
+                                  <p:stCondLst>
+                                    <p:cond delay="0"/>
+                                  </p:stCondLst>
+                                  <p:childTnLst>
+                                    <p:set>
+                                      <p:cBhvr>
+                                        <p:cTn id="12" dur="1" fill="hold">
+                                          <p:stCondLst>
+                                            <p:cond delay="0"/>
+                                          </p:stCondLst>
+                                        </p:cTn>
+                                        <p:tgtEl>
+                                          <p:spTgt spid="3">
+                                            <p:txEl>
+                                              <p:pRg st="5" end="5"/>
+                                            </p:txEl>
+                                          </p:spTgt>
+                                        </p:tgtEl>
+                                        <p:attrNameLst>
+                                          <p:attrName>style.visibility</p:attrName>
+                                        </p:attrNameLst>
+                                      </p:cBhvr>
+                                      <p:to>
+                                        <p:strVal val="visible"/>
+                                      </p:to>
+                                    </p:set>
+                                  </p:childTnLst>
+                                </p:cTn>
+                              </p:par>
+                              <p:par>
+                                <p:cTn id="13" presetID="1" presetClass="entr" presetSubtype="0" fill="hold" nodeType="withEffect">
+                                  <p:stCondLst>
+                                    <p:cond delay="0"/>
+                                  </p:stCondLst>
+                                  <p:childTnLst>
+                                    <p:set>
+                                      <p:cBhvr>
+                                        <p:cTn id="14" dur="1" fill="hold">
+                                          <p:stCondLst>
+                                            <p:cond delay="0"/>
+                                          </p:stCondLst>
+                                        </p:cTn>
+                                        <p:tgtEl>
+                                          <p:spTgt spid="3">
+                                            <p:txEl>
+                                              <p:pRg st="6" end="6"/>
+                                            </p:txEl>
+                                          </p:spTgt>
+                                        </p:tgtEl>
+                                        <p:attrNameLst>
+                                          <p:attrName>style.visibility</p:attrName>
+                                        </p:attrNameLst>
+                                      </p:cBhvr>
+                                      <p:to>
+                                        <p:strVal val="visible"/>
+                                      </p:to>
+                                    </p:set>
+                                  </p:childTnLst>
+                                </p:cTn>
+                              </p:par>
+                              <p:par>
+                                <p:cTn id="15" presetID="1" presetClass="entr" presetSubtype="0" fill="hold" nodeType="withEffect">
+                                  <p:stCondLst>
+                                    <p:cond delay="0"/>
+                                  </p:stCondLst>
+                                  <p:childTnLst>
+                                    <p:set>
+                                      <p:cBhvr>
+                                        <p:cTn id="16" dur="1" fill="hold">
+                                          <p:stCondLst>
+                                            <p:cond delay="0"/>
+                                          </p:stCondLst>
+                                        </p:cTn>
+                                        <p:tgtEl>
+                                          <p:spTgt spid="3">
+                                            <p:txEl>
+                                              <p:pRg st="7" end="7"/>
+                                            </p:txEl>
+                                          </p:spTgt>
+                                        </p:tgtEl>
+                                        <p:attrNameLst>
+                                          <p:attrName>style.visibility</p:attrName>
+                                        </p:attrNameLst>
+                                      </p:cBhvr>
+                                      <p:to>
+                                        <p:strVal val="visible"/>
+                                      </p:to>
+                                    </p:set>
+                                  </p:childTnLst>
+                                </p:cTn>
+                              </p:par>
+                              <p:par>
+                                <p:cTn id="17" presetID="1" presetClass="entr" presetSubtype="0" fill="hold" nodeType="withEffect">
+                                  <p:stCondLst>
+                                    <p:cond delay="0"/>
+                                  </p:stCondLst>
+                                  <p:childTnLst>
+                                    <p:set>
+                                      <p:cBhvr>
+                                        <p:cTn id="18" dur="1" fill="hold">
+                                          <p:stCondLst>
+                                            <p:cond delay="0"/>
+                                          </p:stCondLst>
+                                        </p:cTn>
+                                        <p:tgtEl>
+                                          <p:spTgt spid="3">
+                                            <p:txEl>
+                                              <p:pRg st="8" end="8"/>
+                                            </p:txEl>
+                                          </p:spTgt>
+                                        </p:tgtEl>
+                                        <p:attrNameLst>
+                                          <p:attrName>style.visibility</p:attrName>
+                                        </p:attrNameLst>
+                                      </p:cBhvr>
+                                      <p:to>
+                                        <p:strVal val="visible"/>
+                                      </p:to>
+                                    </p:set>
+                                  </p:childTnLst>
+                                </p:cTn>
+                              </p:par>
+                              <p:par>
+                                <p:cTn id="19" presetID="1" presetClass="entr" presetSubtype="0" fill="hold" nodeType="withEffect">
+                                  <p:stCondLst>
+                                    <p:cond delay="0"/>
+                                  </p:stCondLst>
+                                  <p:childTnLst>
+                                    <p:set>
+                                      <p:cBhvr>
+                                        <p:cTn id="20" dur="1" fill="hold">
+                                          <p:stCondLst>
+                                            <p:cond delay="0"/>
+                                          </p:stCondLst>
+                                        </p:cTn>
+                                        <p:tgtEl>
+                                          <p:spTgt spid="3">
+                                            <p:txEl>
+                                              <p:pRg st="9" end="9"/>
+                                            </p:txEl>
+                                          </p:spTgt>
+                                        </p:tgtEl>
+                                        <p:attrNameLst>
+                                          <p:attrName>style.visibility</p:attrName>
+                                        </p:attrNameLst>
+                                      </p:cBhvr>
+                                      <p:to>
+                                        <p:strVal val="visible"/>
+                                      </p:to>
+                                    </p:set>
+                                  </p:childTnLst>
+                                </p:cTn>
+                              </p:par>
+                              <p:par>
+                                <p:cTn id="21" presetID="1" presetClass="entr" presetSubtype="0" fill="hold" nodeType="withEffect">
+                                  <p:stCondLst>
+                                    <p:cond delay="0"/>
+                                  </p:stCondLst>
+                                  <p:childTnLst>
+                                    <p:set>
+                                      <p:cBhvr>
+                                        <p:cTn id="22" dur="1" fill="hold">
+                                          <p:stCondLst>
+                                            <p:cond delay="0"/>
+                                          </p:stCondLst>
+                                        </p:cTn>
+                                        <p:tgtEl>
+                                          <p:spTgt spid="3">
+                                            <p:txEl>
+                                              <p:pRg st="10" end="10"/>
+                                            </p:txEl>
+                                          </p:spTgt>
+                                        </p:tgtEl>
+                                        <p:attrNameLst>
+                                          <p:attrName>style.visibility</p:attrName>
+                                        </p:attrNameLst>
+                                      </p:cBhvr>
+                                      <p:to>
+                                        <p:strVal val="visible"/>
+                                      </p:to>
+                                    </p:set>
+                                  </p:childTnLst>
+                                </p:cTn>
+                              </p:par>
+                            </p:childTnLst>
+                          </p:cTn>
+                        </p:par>
+                      </p:childTnLst>
+                    </p:cTn>
+                  </p:par>
+                </p:childTnLst>
+              </p:cTn>
+              <p:prevCondLst>
+                <p:cond evt="onPrev" delay="0">
+                  <p:tgtEl>
+                    <p:sldTgt/>
+                  </p:tgtEl>
+                </p:cond>
+              </p:prevCondLst>
+              <p:nextCondLst>
+                <p:cond evt="onNext" delay="0">
+                  <p:tgtEl>
+                    <p:sldTgt/>
+                  </p:tgtEl>
+                </p:cond>
+              </p:nextCondLst>
+            </p:seq>
+          </p:childTnLst>
+        </p:cTn>
       </p:par>
     </p:tnLst>
   </p:timing>
@@ -14612,7 +14966,296 @@
   <p:timing>
     <p:tnLst>
       <p:par>
-        <p:cTn id="1" dur="indefinite" restart="never" nodeType="tmRoot"/>
+        <p:cTn id="1" dur="indefinite" restart="never" nodeType="tmRoot">
+          <p:childTnLst>
+            <p:seq concurrent="1" nextAc="seek">
+              <p:cTn id="2" dur="indefinite" nodeType="mainSeq">
+                <p:childTnLst>
+                  <p:par>
+                    <p:cTn id="3" fill="hold">
+                      <p:stCondLst>
+                        <p:cond delay="indefinite"/>
+                      </p:stCondLst>
+                      <p:childTnLst>
+                        <p:par>
+                          <p:cTn id="4" fill="hold">
+                            <p:stCondLst>
+                              <p:cond delay="0"/>
+                            </p:stCondLst>
+                            <p:childTnLst>
+                              <p:par>
+                                <p:cTn id="5" presetID="1" presetClass="entr" presetSubtype="0" fill="hold" nodeType="clickEffect">
+                                  <p:stCondLst>
+                                    <p:cond delay="0"/>
+                                  </p:stCondLst>
+                                  <p:childTnLst>
+                                    <p:set>
+                                      <p:cBhvr>
+                                        <p:cTn id="6" dur="1" fill="hold">
+                                          <p:stCondLst>
+                                            <p:cond delay="0"/>
+                                          </p:stCondLst>
+                                        </p:cTn>
+                                        <p:tgtEl>
+                                          <p:spTgt spid="3">
+                                            <p:txEl>
+                                              <p:pRg st="2" end="2"/>
+                                            </p:txEl>
+                                          </p:spTgt>
+                                        </p:tgtEl>
+                                        <p:attrNameLst>
+                                          <p:attrName>style.visibility</p:attrName>
+                                        </p:attrNameLst>
+                                      </p:cBhvr>
+                                      <p:to>
+                                        <p:strVal val="visible"/>
+                                      </p:to>
+                                    </p:set>
+                                  </p:childTnLst>
+                                </p:cTn>
+                              </p:par>
+                              <p:par>
+                                <p:cTn id="7" presetID="1" presetClass="entr" presetSubtype="0" fill="hold" nodeType="withEffect">
+                                  <p:stCondLst>
+                                    <p:cond delay="0"/>
+                                  </p:stCondLst>
+                                  <p:childTnLst>
+                                    <p:set>
+                                      <p:cBhvr>
+                                        <p:cTn id="8" dur="1" fill="hold">
+                                          <p:stCondLst>
+                                            <p:cond delay="0"/>
+                                          </p:stCondLst>
+                                        </p:cTn>
+                                        <p:tgtEl>
+                                          <p:spTgt spid="3">
+                                            <p:txEl>
+                                              <p:pRg st="3" end="3"/>
+                                            </p:txEl>
+                                          </p:spTgt>
+                                        </p:tgtEl>
+                                        <p:attrNameLst>
+                                          <p:attrName>style.visibility</p:attrName>
+                                        </p:attrNameLst>
+                                      </p:cBhvr>
+                                      <p:to>
+                                        <p:strVal val="visible"/>
+                                      </p:to>
+                                    </p:set>
+                                  </p:childTnLst>
+                                </p:cTn>
+                              </p:par>
+                              <p:par>
+                                <p:cTn id="9" presetID="1" presetClass="entr" presetSubtype="0" fill="hold" nodeType="withEffect">
+                                  <p:stCondLst>
+                                    <p:cond delay="0"/>
+                                  </p:stCondLst>
+                                  <p:childTnLst>
+                                    <p:set>
+                                      <p:cBhvr>
+                                        <p:cTn id="10" dur="1" fill="hold">
+                                          <p:stCondLst>
+                                            <p:cond delay="0"/>
+                                          </p:stCondLst>
+                                        </p:cTn>
+                                        <p:tgtEl>
+                                          <p:spTgt spid="3">
+                                            <p:txEl>
+                                              <p:pRg st="4" end="4"/>
+                                            </p:txEl>
+                                          </p:spTgt>
+                                        </p:tgtEl>
+                                        <p:attrNameLst>
+                                          <p:attrName>style.visibility</p:attrName>
+                                        </p:attrNameLst>
+                                      </p:cBhvr>
+                                      <p:to>
+                                        <p:strVal val="visible"/>
+                                      </p:to>
+                                    </p:set>
+                                  </p:childTnLst>
+                                </p:cTn>
+                              </p:par>
+                              <p:par>
+                                <p:cTn id="11" presetID="1" presetClass="entr" presetSubtype="0" fill="hold" nodeType="withEffect">
+                                  <p:stCondLst>
+                                    <p:cond delay="0"/>
+                                  </p:stCondLst>
+                                  <p:childTnLst>
+                                    <p:set>
+                                      <p:cBhvr>
+                                        <p:cTn id="12" dur="1" fill="hold">
+                                          <p:stCondLst>
+                                            <p:cond delay="0"/>
+                                          </p:stCondLst>
+                                        </p:cTn>
+                                        <p:tgtEl>
+                                          <p:spTgt spid="3">
+                                            <p:txEl>
+                                              <p:pRg st="5" end="5"/>
+                                            </p:txEl>
+                                          </p:spTgt>
+                                        </p:tgtEl>
+                                        <p:attrNameLst>
+                                          <p:attrName>style.visibility</p:attrName>
+                                        </p:attrNameLst>
+                                      </p:cBhvr>
+                                      <p:to>
+                                        <p:strVal val="visible"/>
+                                      </p:to>
+                                    </p:set>
+                                  </p:childTnLst>
+                                </p:cTn>
+                              </p:par>
+                              <p:par>
+                                <p:cTn id="13" presetID="1" presetClass="entr" presetSubtype="0" fill="hold" nodeType="withEffect">
+                                  <p:stCondLst>
+                                    <p:cond delay="0"/>
+                                  </p:stCondLst>
+                                  <p:childTnLst>
+                                    <p:set>
+                                      <p:cBhvr>
+                                        <p:cTn id="14" dur="1" fill="hold">
+                                          <p:stCondLst>
+                                            <p:cond delay="0"/>
+                                          </p:stCondLst>
+                                        </p:cTn>
+                                        <p:tgtEl>
+                                          <p:spTgt spid="3">
+                                            <p:txEl>
+                                              <p:pRg st="6" end="6"/>
+                                            </p:txEl>
+                                          </p:spTgt>
+                                        </p:tgtEl>
+                                        <p:attrNameLst>
+                                          <p:attrName>style.visibility</p:attrName>
+                                        </p:attrNameLst>
+                                      </p:cBhvr>
+                                      <p:to>
+                                        <p:strVal val="visible"/>
+                                      </p:to>
+                                    </p:set>
+                                  </p:childTnLst>
+                                </p:cTn>
+                              </p:par>
+                              <p:par>
+                                <p:cTn id="15" presetID="1" presetClass="entr" presetSubtype="0" fill="hold" nodeType="withEffect">
+                                  <p:stCondLst>
+                                    <p:cond delay="0"/>
+                                  </p:stCondLst>
+                                  <p:childTnLst>
+                                    <p:set>
+                                      <p:cBhvr>
+                                        <p:cTn id="16" dur="1" fill="hold">
+                                          <p:stCondLst>
+                                            <p:cond delay="0"/>
+                                          </p:stCondLst>
+                                        </p:cTn>
+                                        <p:tgtEl>
+                                          <p:spTgt spid="3">
+                                            <p:txEl>
+                                              <p:pRg st="7" end="7"/>
+                                            </p:txEl>
+                                          </p:spTgt>
+                                        </p:tgtEl>
+                                        <p:attrNameLst>
+                                          <p:attrName>style.visibility</p:attrName>
+                                        </p:attrNameLst>
+                                      </p:cBhvr>
+                                      <p:to>
+                                        <p:strVal val="visible"/>
+                                      </p:to>
+                                    </p:set>
+                                  </p:childTnLst>
+                                </p:cTn>
+                              </p:par>
+                              <p:par>
+                                <p:cTn id="17" presetID="1" presetClass="entr" presetSubtype="0" fill="hold" nodeType="withEffect">
+                                  <p:stCondLst>
+                                    <p:cond delay="0"/>
+                                  </p:stCondLst>
+                                  <p:childTnLst>
+                                    <p:set>
+                                      <p:cBhvr>
+                                        <p:cTn id="18" dur="1" fill="hold">
+                                          <p:stCondLst>
+                                            <p:cond delay="0"/>
+                                          </p:stCondLst>
+                                        </p:cTn>
+                                        <p:tgtEl>
+                                          <p:spTgt spid="3">
+                                            <p:txEl>
+                                              <p:pRg st="8" end="8"/>
+                                            </p:txEl>
+                                          </p:spTgt>
+                                        </p:tgtEl>
+                                        <p:attrNameLst>
+                                          <p:attrName>style.visibility</p:attrName>
+                                        </p:attrNameLst>
+                                      </p:cBhvr>
+                                      <p:to>
+                                        <p:strVal val="visible"/>
+                                      </p:to>
+                                    </p:set>
+                                  </p:childTnLst>
+                                </p:cTn>
+                              </p:par>
+                              <p:par>
+                                <p:cTn id="19" presetID="1" presetClass="entr" presetSubtype="0" fill="hold" nodeType="withEffect">
+                                  <p:stCondLst>
+                                    <p:cond delay="0"/>
+                                  </p:stCondLst>
+                                  <p:childTnLst>
+                                    <p:set>
+                                      <p:cBhvr>
+                                        <p:cTn id="20" dur="1" fill="hold">
+                                          <p:stCondLst>
+                                            <p:cond delay="0"/>
+                                          </p:stCondLst>
+                                        </p:cTn>
+                                        <p:tgtEl>
+                                          <p:spTgt spid="3">
+                                            <p:txEl>
+                                              <p:pRg st="9" end="9"/>
+                                            </p:txEl>
+                                          </p:spTgt>
+                                        </p:tgtEl>
+                                        <p:attrNameLst>
+                                          <p:attrName>style.visibility</p:attrName>
+                                        </p:attrNameLst>
+                                      </p:cBhvr>
+                                      <p:to>
+                                        <p:strVal val="visible"/>
+                                      </p:to>
+                                    </p:set>
+                                  </p:childTnLst>
+                                </p:cTn>
+                              </p:par>
+                            </p:childTnLst>
+                          </p:cTn>
+                        </p:par>
+                      </p:childTnLst>
+                    </p:cTn>
+                  </p:par>
+                </p:childTnLst>
+              </p:cTn>
+              <p:prevCondLst>
+                <p:cond evt="onPrev" delay="0">
+                  <p:tgtEl>
+                    <p:sldTgt/>
+                  </p:tgtEl>
+                </p:cond>
+              </p:prevCondLst>
+              <p:nextCondLst>
+                <p:cond evt="onNext" delay="0">
+                  <p:tgtEl>
+                    <p:sldTgt/>
+                  </p:tgtEl>
+                </p:cond>
+              </p:nextCondLst>
+            </p:seq>
+          </p:childTnLst>
+        </p:cTn>
       </p:par>
     </p:tnLst>
   </p:timing>
@@ -15439,7 +16082,358 @@
   <p:timing>
     <p:tnLst>
       <p:par>
-        <p:cTn id="1" dur="indefinite" restart="never" nodeType="tmRoot"/>
+        <p:cTn id="1" dur="indefinite" restart="never" nodeType="tmRoot">
+          <p:childTnLst>
+            <p:seq concurrent="1" nextAc="seek">
+              <p:cTn id="2" dur="indefinite" nodeType="mainSeq">
+                <p:childTnLst>
+                  <p:par>
+                    <p:cTn id="3" fill="hold">
+                      <p:stCondLst>
+                        <p:cond delay="indefinite"/>
+                      </p:stCondLst>
+                      <p:childTnLst>
+                        <p:par>
+                          <p:cTn id="4" fill="hold">
+                            <p:stCondLst>
+                              <p:cond delay="0"/>
+                            </p:stCondLst>
+                            <p:childTnLst>
+                              <p:par>
+                                <p:cTn id="5" presetID="1" presetClass="entr" presetSubtype="0" fill="hold" nodeType="clickEffect">
+                                  <p:stCondLst>
+                                    <p:cond delay="0"/>
+                                  </p:stCondLst>
+                                  <p:childTnLst>
+                                    <p:set>
+                                      <p:cBhvr>
+                                        <p:cTn id="6" dur="1" fill="hold">
+                                          <p:stCondLst>
+                                            <p:cond delay="0"/>
+                                          </p:stCondLst>
+                                        </p:cTn>
+                                        <p:tgtEl>
+                                          <p:spTgt spid="3">
+                                            <p:txEl>
+                                              <p:pRg st="2" end="2"/>
+                                            </p:txEl>
+                                          </p:spTgt>
+                                        </p:tgtEl>
+                                        <p:attrNameLst>
+                                          <p:attrName>style.visibility</p:attrName>
+                                        </p:attrNameLst>
+                                      </p:cBhvr>
+                                      <p:to>
+                                        <p:strVal val="visible"/>
+                                      </p:to>
+                                    </p:set>
+                                  </p:childTnLst>
+                                </p:cTn>
+                              </p:par>
+                              <p:par>
+                                <p:cTn id="7" presetID="1" presetClass="entr" presetSubtype="0" fill="hold" nodeType="withEffect">
+                                  <p:stCondLst>
+                                    <p:cond delay="0"/>
+                                  </p:stCondLst>
+                                  <p:childTnLst>
+                                    <p:set>
+                                      <p:cBhvr>
+                                        <p:cTn id="8" dur="1" fill="hold">
+                                          <p:stCondLst>
+                                            <p:cond delay="0"/>
+                                          </p:stCondLst>
+                                        </p:cTn>
+                                        <p:tgtEl>
+                                          <p:spTgt spid="3">
+                                            <p:txEl>
+                                              <p:pRg st="3" end="3"/>
+                                            </p:txEl>
+                                          </p:spTgt>
+                                        </p:tgtEl>
+                                        <p:attrNameLst>
+                                          <p:attrName>style.visibility</p:attrName>
+                                        </p:attrNameLst>
+                                      </p:cBhvr>
+                                      <p:to>
+                                        <p:strVal val="visible"/>
+                                      </p:to>
+                                    </p:set>
+                                  </p:childTnLst>
+                                </p:cTn>
+                              </p:par>
+                              <p:par>
+                                <p:cTn id="9" presetID="1" presetClass="entr" presetSubtype="0" fill="hold" nodeType="withEffect">
+                                  <p:stCondLst>
+                                    <p:cond delay="0"/>
+                                  </p:stCondLst>
+                                  <p:childTnLst>
+                                    <p:set>
+                                      <p:cBhvr>
+                                        <p:cTn id="10" dur="1" fill="hold">
+                                          <p:stCondLst>
+                                            <p:cond delay="0"/>
+                                          </p:stCondLst>
+                                        </p:cTn>
+                                        <p:tgtEl>
+                                          <p:spTgt spid="3">
+                                            <p:txEl>
+                                              <p:pRg st="4" end="4"/>
+                                            </p:txEl>
+                                          </p:spTgt>
+                                        </p:tgtEl>
+                                        <p:attrNameLst>
+                                          <p:attrName>style.visibility</p:attrName>
+                                        </p:attrNameLst>
+                                      </p:cBhvr>
+                                      <p:to>
+                                        <p:strVal val="visible"/>
+                                      </p:to>
+                                    </p:set>
+                                  </p:childTnLst>
+                                </p:cTn>
+                              </p:par>
+                              <p:par>
+                                <p:cTn id="11" presetID="1" presetClass="entr" presetSubtype="0" fill="hold" nodeType="withEffect">
+                                  <p:stCondLst>
+                                    <p:cond delay="0"/>
+                                  </p:stCondLst>
+                                  <p:childTnLst>
+                                    <p:set>
+                                      <p:cBhvr>
+                                        <p:cTn id="12" dur="1" fill="hold">
+                                          <p:stCondLst>
+                                            <p:cond delay="0"/>
+                                          </p:stCondLst>
+                                        </p:cTn>
+                                        <p:tgtEl>
+                                          <p:spTgt spid="3">
+                                            <p:txEl>
+                                              <p:pRg st="5" end="5"/>
+                                            </p:txEl>
+                                          </p:spTgt>
+                                        </p:tgtEl>
+                                        <p:attrNameLst>
+                                          <p:attrName>style.visibility</p:attrName>
+                                        </p:attrNameLst>
+                                      </p:cBhvr>
+                                      <p:to>
+                                        <p:strVal val="visible"/>
+                                      </p:to>
+                                    </p:set>
+                                  </p:childTnLst>
+                                </p:cTn>
+                              </p:par>
+                              <p:par>
+                                <p:cTn id="13" presetID="1" presetClass="entr" presetSubtype="0" fill="hold" nodeType="withEffect">
+                                  <p:stCondLst>
+                                    <p:cond delay="0"/>
+                                  </p:stCondLst>
+                                  <p:childTnLst>
+                                    <p:set>
+                                      <p:cBhvr>
+                                        <p:cTn id="14" dur="1" fill="hold">
+                                          <p:stCondLst>
+                                            <p:cond delay="0"/>
+                                          </p:stCondLst>
+                                        </p:cTn>
+                                        <p:tgtEl>
+                                          <p:spTgt spid="3">
+                                            <p:txEl>
+                                              <p:pRg st="6" end="6"/>
+                                            </p:txEl>
+                                          </p:spTgt>
+                                        </p:tgtEl>
+                                        <p:attrNameLst>
+                                          <p:attrName>style.visibility</p:attrName>
+                                        </p:attrNameLst>
+                                      </p:cBhvr>
+                                      <p:to>
+                                        <p:strVal val="visible"/>
+                                      </p:to>
+                                    </p:set>
+                                  </p:childTnLst>
+                                </p:cTn>
+                              </p:par>
+                              <p:par>
+                                <p:cTn id="15" presetID="1" presetClass="entr" presetSubtype="0" fill="hold" nodeType="withEffect">
+                                  <p:stCondLst>
+                                    <p:cond delay="0"/>
+                                  </p:stCondLst>
+                                  <p:childTnLst>
+                                    <p:set>
+                                      <p:cBhvr>
+                                        <p:cTn id="16" dur="1" fill="hold">
+                                          <p:stCondLst>
+                                            <p:cond delay="0"/>
+                                          </p:stCondLst>
+                                        </p:cTn>
+                                        <p:tgtEl>
+                                          <p:spTgt spid="3">
+                                            <p:txEl>
+                                              <p:pRg st="7" end="7"/>
+                                            </p:txEl>
+                                          </p:spTgt>
+                                        </p:tgtEl>
+                                        <p:attrNameLst>
+                                          <p:attrName>style.visibility</p:attrName>
+                                        </p:attrNameLst>
+                                      </p:cBhvr>
+                                      <p:to>
+                                        <p:strVal val="visible"/>
+                                      </p:to>
+                                    </p:set>
+                                  </p:childTnLst>
+                                </p:cTn>
+                              </p:par>
+                              <p:par>
+                                <p:cTn id="17" presetID="1" presetClass="entr" presetSubtype="0" fill="hold" nodeType="withEffect">
+                                  <p:stCondLst>
+                                    <p:cond delay="0"/>
+                                  </p:stCondLst>
+                                  <p:childTnLst>
+                                    <p:set>
+                                      <p:cBhvr>
+                                        <p:cTn id="18" dur="1" fill="hold">
+                                          <p:stCondLst>
+                                            <p:cond delay="0"/>
+                                          </p:stCondLst>
+                                        </p:cTn>
+                                        <p:tgtEl>
+                                          <p:spTgt spid="3">
+                                            <p:txEl>
+                                              <p:pRg st="8" end="8"/>
+                                            </p:txEl>
+                                          </p:spTgt>
+                                        </p:tgtEl>
+                                        <p:attrNameLst>
+                                          <p:attrName>style.visibility</p:attrName>
+                                        </p:attrNameLst>
+                                      </p:cBhvr>
+                                      <p:to>
+                                        <p:strVal val="visible"/>
+                                      </p:to>
+                                    </p:set>
+                                  </p:childTnLst>
+                                </p:cTn>
+                              </p:par>
+                              <p:par>
+                                <p:cTn id="19" presetID="1" presetClass="entr" presetSubtype="0" fill="hold" nodeType="withEffect">
+                                  <p:stCondLst>
+                                    <p:cond delay="0"/>
+                                  </p:stCondLst>
+                                  <p:childTnLst>
+                                    <p:set>
+                                      <p:cBhvr>
+                                        <p:cTn id="20" dur="1" fill="hold">
+                                          <p:stCondLst>
+                                            <p:cond delay="0"/>
+                                          </p:stCondLst>
+                                        </p:cTn>
+                                        <p:tgtEl>
+                                          <p:spTgt spid="3">
+                                            <p:txEl>
+                                              <p:pRg st="9" end="9"/>
+                                            </p:txEl>
+                                          </p:spTgt>
+                                        </p:tgtEl>
+                                        <p:attrNameLst>
+                                          <p:attrName>style.visibility</p:attrName>
+                                        </p:attrNameLst>
+                                      </p:cBhvr>
+                                      <p:to>
+                                        <p:strVal val="visible"/>
+                                      </p:to>
+                                    </p:set>
+                                  </p:childTnLst>
+                                </p:cTn>
+                              </p:par>
+                              <p:par>
+                                <p:cTn id="21" presetID="1" presetClass="entr" presetSubtype="0" fill="hold" nodeType="withEffect">
+                                  <p:stCondLst>
+                                    <p:cond delay="0"/>
+                                  </p:stCondLst>
+                                  <p:childTnLst>
+                                    <p:set>
+                                      <p:cBhvr>
+                                        <p:cTn id="22" dur="1" fill="hold">
+                                          <p:stCondLst>
+                                            <p:cond delay="0"/>
+                                          </p:stCondLst>
+                                        </p:cTn>
+                                        <p:tgtEl>
+                                          <p:spTgt spid="3">
+                                            <p:txEl>
+                                              <p:pRg st="10" end="10"/>
+                                            </p:txEl>
+                                          </p:spTgt>
+                                        </p:tgtEl>
+                                        <p:attrNameLst>
+                                          <p:attrName>style.visibility</p:attrName>
+                                        </p:attrNameLst>
+                                      </p:cBhvr>
+                                      <p:to>
+                                        <p:strVal val="visible"/>
+                                      </p:to>
+                                    </p:set>
+                                  </p:childTnLst>
+                                </p:cTn>
+                              </p:par>
+                              <p:par>
+                                <p:cTn id="23" presetID="1" presetClass="entr" presetSubtype="0" fill="hold" nodeType="withEffect">
+                                  <p:stCondLst>
+                                    <p:cond delay="0"/>
+                                  </p:stCondLst>
+                                  <p:childTnLst>
+                                    <p:set>
+                                      <p:cBhvr>
+                                        <p:cTn id="24" dur="1" fill="hold">
+                                          <p:stCondLst>
+                                            <p:cond delay="0"/>
+                                          </p:stCondLst>
+                                        </p:cTn>
+                                        <p:tgtEl>
+                                          <p:spTgt spid="3">
+                                            <p:txEl>
+                                              <p:pRg st="11" end="11"/>
+                                            </p:txEl>
+                                          </p:spTgt>
+                                        </p:tgtEl>
+                                        <p:attrNameLst>
+                                          <p:attrName>style.visibility</p:attrName>
+                                        </p:attrNameLst>
+                                      </p:cBhvr>
+                                      <p:to>
+                                        <p:strVal val="visible"/>
+                                      </p:to>
+                                    </p:set>
+                                  </p:childTnLst>
+                                </p:cTn>
+                              </p:par>
+                            </p:childTnLst>
+                          </p:cTn>
+                        </p:par>
+                      </p:childTnLst>
+                    </p:cTn>
+                  </p:par>
+                </p:childTnLst>
+              </p:cTn>
+              <p:prevCondLst>
+                <p:cond evt="onPrev" delay="0">
+                  <p:tgtEl>
+                    <p:sldTgt/>
+                  </p:tgtEl>
+                </p:cond>
+              </p:prevCondLst>
+              <p:nextCondLst>
+                <p:cond evt="onNext" delay="0">
+                  <p:tgtEl>
+                    <p:sldTgt/>
+                  </p:tgtEl>
+                </p:cond>
+              </p:nextCondLst>
+            </p:seq>
+          </p:childTnLst>
+        </p:cTn>
       </p:par>
     </p:tnLst>
   </p:timing>

</xml_diff>

<commit_message>
small edits to Lab 1
</commit_message>
<xml_diff>
--- a/Week 1 -- Likelihoods and linear models/Lab 1/Lab 1 -- Generalized linear models.pptx
+++ b/Week 1 -- Likelihoods and linear models/Lab 1/Lab 1 -- Generalized linear models.pptx
@@ -3780,11 +3780,7 @@
           <a:p>
             <a:r>
               <a:rPr lang="en-US" dirty="0" smtClean="0"/>
-              <a:t>March 31, </a:t>
-            </a:r>
-            <a:r>
-              <a:rPr lang="en-US" dirty="0" smtClean="0"/>
-              <a:t>2016</a:t>
+              <a:t>March 31, 2016</a:t>
             </a:r>
             <a:endParaRPr lang="en-US" dirty="0"/>
           </a:p>
@@ -5576,8 +5572,8 @@
           </a:p>
         </p:txBody>
       </p:sp>
-      <mc:AlternateContent xmlns:mc="http://schemas.openxmlformats.org/markup-compatibility/2006" xmlns:a14="http://schemas.microsoft.com/office/drawing/2010/main">
-        <mc:Choice Requires="a14">
+      <mc:AlternateContent xmlns:mc="http://schemas.openxmlformats.org/markup-compatibility/2006">
+        <mc:Choice xmlns:a14="http://schemas.microsoft.com/office/drawing/2010/main" Requires="a14">
           <p:sp>
             <p:nvSpPr>
               <p:cNvPr id="3" name="Content Placeholder 2"/>
@@ -5778,6 +5774,18 @@
                               </m:ctrlPr>
                             </m:dPr>
                             <m:e>
+                              <m:r>
+                                <a:rPr lang="en-US" b="0" i="1" smtClean="0">
+                                  <a:latin typeface="Cambria Math" panose="02040503050406030204" pitchFamily="18" charset="0"/>
+                                </a:rPr>
+                                <m:t>𝐶</m:t>
+                              </m:r>
+                              <m:r>
+                                <a:rPr lang="en-US" b="0" i="1" smtClean="0">
+                                  <a:latin typeface="Cambria Math" panose="02040503050406030204" pitchFamily="18" charset="0"/>
+                                </a:rPr>
+                                <m:t>=</m:t>
+                              </m:r>
                               <m:sSub>
                                 <m:sSubPr>
                                   <m:ctrlPr>
@@ -5928,58 +5936,69 @@
                             </m:mr>
                             <m:mr>
                               <m:e>
-                                <m:r>
-                                  <a:rPr lang="en-US" b="0" i="1" smtClean="0">
-                                    <a:latin typeface="Cambria Math" panose="02040503050406030204" pitchFamily="18" charset="0"/>
-                                  </a:rPr>
-                                  <m:t>(1−</m:t>
-                                </m:r>
-                                <m:sSub>
-                                  <m:sSubPr>
+                                <m:d>
+                                  <m:dPr>
                                     <m:ctrlPr>
-                                      <a:rPr lang="en-US" i="1">
+                                      <a:rPr lang="en-US" b="0" i="1" smtClean="0">
                                         <a:latin typeface="Cambria Math" panose="02040503050406030204" pitchFamily="18" charset="0"/>
-                                        <a:ea typeface="Cambria Math" panose="02040503050406030204" pitchFamily="18" charset="0"/>
                                       </a:rPr>
                                     </m:ctrlPr>
-                                  </m:sSubPr>
+                                  </m:dPr>
                                   <m:e>
                                     <m:r>
-                                      <m:rPr>
-                                        <m:brk m:alnAt="7"/>
-                                      </m:rPr>
-                                      <a:rPr lang="en-US" i="1">
+                                      <a:rPr lang="en-US" b="0" i="1" smtClean="0">
                                         <a:latin typeface="Cambria Math" panose="02040503050406030204" pitchFamily="18" charset="0"/>
-                                        <a:ea typeface="Cambria Math" panose="02040503050406030204" pitchFamily="18" charset="0"/>
                                       </a:rPr>
-                                      <m:t>𝜃</m:t>
+                                      <m:t>1−</m:t>
                                     </m:r>
+                                    <m:sSub>
+                                      <m:sSubPr>
+                                        <m:ctrlPr>
+                                          <a:rPr lang="en-US" i="1">
+                                            <a:latin typeface="Cambria Math" panose="02040503050406030204" pitchFamily="18" charset="0"/>
+                                            <a:ea typeface="Cambria Math" panose="02040503050406030204" pitchFamily="18" charset="0"/>
+                                          </a:rPr>
+                                        </m:ctrlPr>
+                                      </m:sSubPr>
+                                      <m:e>
+                                        <m:r>
+                                          <m:rPr>
+                                            <m:brk m:alnAt="7"/>
+                                          </m:rPr>
+                                          <a:rPr lang="en-US" i="1">
+                                            <a:latin typeface="Cambria Math" panose="02040503050406030204" pitchFamily="18" charset="0"/>
+                                            <a:ea typeface="Cambria Math" panose="02040503050406030204" pitchFamily="18" charset="0"/>
+                                          </a:rPr>
+                                          <m:t>𝜃</m:t>
+                                        </m:r>
+                                      </m:e>
+                                      <m:sub>
+                                        <m:r>
+                                          <m:rPr>
+                                            <m:brk m:alnAt="7"/>
+                                          </m:rPr>
+                                          <a:rPr lang="en-US" i="1">
+                                            <a:latin typeface="Cambria Math" panose="02040503050406030204" pitchFamily="18" charset="0"/>
+                                            <a:ea typeface="Cambria Math" panose="02040503050406030204" pitchFamily="18" charset="0"/>
+                                          </a:rPr>
+                                          <m:t>1</m:t>
+                                        </m:r>
+                                      </m:sub>
+                                    </m:sSub>
                                   </m:e>
-                                  <m:sub>
-                                    <m:r>
-                                      <m:rPr>
-                                        <m:brk m:alnAt="7"/>
-                                      </m:rPr>
-                                      <a:rPr lang="en-US" i="1">
-                                        <a:latin typeface="Cambria Math" panose="02040503050406030204" pitchFamily="18" charset="0"/>
-                                        <a:ea typeface="Cambria Math" panose="02040503050406030204" pitchFamily="18" charset="0"/>
-                                      </a:rPr>
-                                      <m:t>1</m:t>
-                                    </m:r>
-                                  </m:sub>
-                                </m:sSub>
+                                </m:d>
                                 <m:r>
                                   <a:rPr lang="en-US" b="0" i="1" smtClean="0">
                                     <a:latin typeface="Cambria Math" panose="02040503050406030204" pitchFamily="18" charset="0"/>
                                     <a:ea typeface="Cambria Math" panose="02040503050406030204" pitchFamily="18" charset="0"/>
                                   </a:rPr>
-                                  <m:t>)</m:t>
+                                  <m:t>𝐿𝑜𝑔𝑛</m:t>
                                 </m:r>
                                 <m:r>
                                   <a:rPr lang="en-US" b="0" i="1" smtClean="0">
                                     <a:latin typeface="Cambria Math" panose="02040503050406030204" pitchFamily="18" charset="0"/>
                                   </a:rPr>
-                                  <m:t>𝐿𝑜𝑔𝑛𝑜𝑟𝑚𝑎𝑙</m:t>
+                                  <m:t>𝑜𝑟𝑚𝑎𝑙</m:t>
                                 </m:r>
                                 <m:r>
                                   <a:rPr lang="en-US" b="0" i="1" smtClean="0">
@@ -6137,7 +6156,7 @@
             </p:txBody>
           </p:sp>
         </mc:Choice>
-        <mc:Fallback xmlns="">
+        <mc:Fallback>
           <p:sp>
             <p:nvSpPr>
               <p:cNvPr id="3" name="Content Placeholder 2"/>
@@ -7664,7 +7683,6 @@
               <a:rPr lang="en-US" dirty="0" smtClean="0"/>
               <a:t>Decent fit…</a:t>
             </a:r>
-            <a:endParaRPr lang="en-US" dirty="0" smtClean="0"/>
           </a:p>
           <a:p>
             <a:pPr lvl="1"/>
@@ -7758,8 +7776,8 @@
           </a:p>
         </p:txBody>
       </p:sp>
-      <mc:AlternateContent xmlns:mc="http://schemas.openxmlformats.org/markup-compatibility/2006">
-        <mc:Choice xmlns:a14="http://schemas.microsoft.com/office/drawing/2010/main" Requires="a14">
+      <mc:AlternateContent xmlns:mc="http://schemas.openxmlformats.org/markup-compatibility/2006" xmlns:a14="http://schemas.microsoft.com/office/drawing/2010/main">
+        <mc:Choice Requires="a14">
           <p:sp>
             <p:nvSpPr>
               <p:cNvPr id="3" name="Content Placeholder 2"/>
@@ -8568,12 +8586,11 @@
                   <a:rPr lang="en-GB" dirty="0"/>
                   <a:t>, 24, 997–1016.</a:t>
                 </a:r>
-                <a:endParaRPr lang="en-GB" dirty="0"/>
               </a:p>
             </p:txBody>
           </p:sp>
         </mc:Choice>
-        <mc:Fallback>
+        <mc:Fallback xmlns="">
           <p:sp>
             <p:nvSpPr>
               <p:cNvPr id="3" name="Content Placeholder 2"/>
@@ -8663,8 +8680,8 @@
           </a:p>
         </p:txBody>
       </p:sp>
-      <mc:AlternateContent xmlns:mc="http://schemas.openxmlformats.org/markup-compatibility/2006">
-        <mc:Choice xmlns:a14="http://schemas.microsoft.com/office/drawing/2010/main" Requires="a14">
+      <mc:AlternateContent xmlns:mc="http://schemas.openxmlformats.org/markup-compatibility/2006" xmlns:a14="http://schemas.microsoft.com/office/drawing/2010/main">
+        <mc:Choice Requires="a14">
           <p:sp>
             <p:nvSpPr>
               <p:cNvPr id="3" name="Content Placeholder 2"/>
@@ -8954,7 +8971,7 @@
             </p:txBody>
           </p:sp>
         </mc:Choice>
-        <mc:Fallback>
+        <mc:Fallback xmlns="">
           <p:sp>
             <p:nvSpPr>
               <p:cNvPr id="3" name="Content Placeholder 2"/>

</xml_diff>